<commit_message>
präsentation bimatrix folie erweitert
</commit_message>
<xml_diff>
--- a/Dokumente/Abschluss/Präsentation.pptx
+++ b/Dokumente/Abschluss/Präsentation.pptx
@@ -8,10 +8,11 @@
     <p:sldId id="257" r:id="rId2"/>
     <p:sldId id="275" r:id="rId3"/>
     <p:sldId id="274" r:id="rId4"/>
-    <p:sldId id="272" r:id="rId5"/>
-    <p:sldId id="273" r:id="rId6"/>
-    <p:sldId id="276" r:id="rId7"/>
-    <p:sldId id="277" r:id="rId8"/>
+    <p:sldId id="278" r:id="rId5"/>
+    <p:sldId id="272" r:id="rId6"/>
+    <p:sldId id="273" r:id="rId7"/>
+    <p:sldId id="276" r:id="rId8"/>
+    <p:sldId id="277" r:id="rId9"/>
   </p:sldIdLst>
   <p:sldSz cx="12192000" cy="6858000"/>
   <p:notesSz cx="6858000" cy="9144000"/>
@@ -110,6 +111,11 @@
       </a:defRPr>
     </a:lvl9pPr>
   </p:defaultTextStyle>
+  <p:extLst>
+    <p:ext uri="{EFAFB233-063F-42B5-8137-9DF3F51BA10A}">
+      <p15:sldGuideLst xmlns:p15="http://schemas.microsoft.com/office/powerpoint/2012/main"/>
+    </p:ext>
+  </p:extLst>
 </p:presentation>
 </file>
 
@@ -260,7 +266,7 @@
           <a:p>
             <a:fld id="{4E8BA868-D81B-4F26-A41C-24BC2A794736}" type="datetimeFigureOut">
               <a:rPr lang="de-DE" smtClean="0"/>
-              <a:t>15.03.2019</a:t>
+              <a:t>17.03.2019</a:t>
             </a:fld>
             <a:endParaRPr lang="de-DE"/>
           </a:p>
@@ -458,7 +464,7 @@
           <a:p>
             <a:fld id="{4E8BA868-D81B-4F26-A41C-24BC2A794736}" type="datetimeFigureOut">
               <a:rPr lang="de-DE" smtClean="0"/>
-              <a:t>15.03.2019</a:t>
+              <a:t>17.03.2019</a:t>
             </a:fld>
             <a:endParaRPr lang="de-DE"/>
           </a:p>
@@ -666,7 +672,7 @@
           <a:p>
             <a:fld id="{4E8BA868-D81B-4F26-A41C-24BC2A794736}" type="datetimeFigureOut">
               <a:rPr lang="de-DE" smtClean="0"/>
-              <a:t>15.03.2019</a:t>
+              <a:t>17.03.2019</a:t>
             </a:fld>
             <a:endParaRPr lang="de-DE"/>
           </a:p>
@@ -864,7 +870,7 @@
           <a:p>
             <a:fld id="{4E8BA868-D81B-4F26-A41C-24BC2A794736}" type="datetimeFigureOut">
               <a:rPr lang="de-DE" smtClean="0"/>
-              <a:t>15.03.2019</a:t>
+              <a:t>17.03.2019</a:t>
             </a:fld>
             <a:endParaRPr lang="de-DE"/>
           </a:p>
@@ -1139,7 +1145,7 @@
           <a:p>
             <a:fld id="{4E8BA868-D81B-4F26-A41C-24BC2A794736}" type="datetimeFigureOut">
               <a:rPr lang="de-DE" smtClean="0"/>
-              <a:t>15.03.2019</a:t>
+              <a:t>17.03.2019</a:t>
             </a:fld>
             <a:endParaRPr lang="de-DE"/>
           </a:p>
@@ -1404,7 +1410,7 @@
           <a:p>
             <a:fld id="{4E8BA868-D81B-4F26-A41C-24BC2A794736}" type="datetimeFigureOut">
               <a:rPr lang="de-DE" smtClean="0"/>
-              <a:t>15.03.2019</a:t>
+              <a:t>17.03.2019</a:t>
             </a:fld>
             <a:endParaRPr lang="de-DE"/>
           </a:p>
@@ -1816,7 +1822,7 @@
           <a:p>
             <a:fld id="{4E8BA868-D81B-4F26-A41C-24BC2A794736}" type="datetimeFigureOut">
               <a:rPr lang="de-DE" smtClean="0"/>
-              <a:t>15.03.2019</a:t>
+              <a:t>17.03.2019</a:t>
             </a:fld>
             <a:endParaRPr lang="de-DE"/>
           </a:p>
@@ -1957,7 +1963,7 @@
           <a:p>
             <a:fld id="{4E8BA868-D81B-4F26-A41C-24BC2A794736}" type="datetimeFigureOut">
               <a:rPr lang="de-DE" smtClean="0"/>
-              <a:t>15.03.2019</a:t>
+              <a:t>17.03.2019</a:t>
             </a:fld>
             <a:endParaRPr lang="de-DE"/>
           </a:p>
@@ -2070,7 +2076,7 @@
           <a:p>
             <a:fld id="{4E8BA868-D81B-4F26-A41C-24BC2A794736}" type="datetimeFigureOut">
               <a:rPr lang="de-DE" smtClean="0"/>
-              <a:t>15.03.2019</a:t>
+              <a:t>17.03.2019</a:t>
             </a:fld>
             <a:endParaRPr lang="de-DE"/>
           </a:p>
@@ -2381,7 +2387,7 @@
           <a:p>
             <a:fld id="{4E8BA868-D81B-4F26-A41C-24BC2A794736}" type="datetimeFigureOut">
               <a:rPr lang="de-DE" smtClean="0"/>
-              <a:t>15.03.2019</a:t>
+              <a:t>17.03.2019</a:t>
             </a:fld>
             <a:endParaRPr lang="de-DE"/>
           </a:p>
@@ -2669,7 +2675,7 @@
           <a:p>
             <a:fld id="{4E8BA868-D81B-4F26-A41C-24BC2A794736}" type="datetimeFigureOut">
               <a:rPr lang="de-DE" smtClean="0"/>
-              <a:t>15.03.2019</a:t>
+              <a:t>17.03.2019</a:t>
             </a:fld>
             <a:endParaRPr lang="de-DE"/>
           </a:p>
@@ -2910,7 +2916,7 @@
           <a:p>
             <a:fld id="{4E8BA868-D81B-4F26-A41C-24BC2A794736}" type="datetimeFigureOut">
               <a:rPr lang="de-DE" smtClean="0"/>
-              <a:t>15.03.2019</a:t>
+              <a:t>17.03.2019</a:t>
             </a:fld>
             <a:endParaRPr lang="de-DE"/>
           </a:p>
@@ -4964,6 +4970,336 @@
           </a:p>
         </p:txBody>
       </p:sp>
+      <p:grpSp>
+        <p:nvGrpSpPr>
+          <p:cNvPr id="4" name="Gruppieren 3">
+            <a:extLst>
+              <a:ext uri="{FF2B5EF4-FFF2-40B4-BE49-F238E27FC236}">
+                <a16:creationId xmlns:a16="http://schemas.microsoft.com/office/drawing/2014/main" id="{F3423D04-1826-4C1F-9B41-D18996569C6F}"/>
+              </a:ext>
+            </a:extLst>
+          </p:cNvPr>
+          <p:cNvGrpSpPr/>
+          <p:nvPr/>
+        </p:nvGrpSpPr>
+        <p:grpSpPr>
+          <a:xfrm>
+            <a:off x="5315964" y="1373937"/>
+            <a:ext cx="1800000" cy="2134708"/>
+            <a:chOff x="5315964" y="1373937"/>
+            <a:chExt cx="1800000" cy="2134708"/>
+          </a:xfrm>
+        </p:grpSpPr>
+        <p:sp>
+          <p:nvSpPr>
+            <p:cNvPr id="2" name="Bogen 1">
+              <a:extLst>
+                <a:ext uri="{FF2B5EF4-FFF2-40B4-BE49-F238E27FC236}">
+                  <a16:creationId xmlns:a16="http://schemas.microsoft.com/office/drawing/2014/main" id="{DEFFEECD-909C-4CFB-A703-29EF59F2CB34}"/>
+                </a:ext>
+              </a:extLst>
+            </p:cNvPr>
+            <p:cNvSpPr/>
+            <p:nvPr/>
+          </p:nvSpPr>
+          <p:spPr>
+            <a:xfrm rot="-2700000">
+              <a:off x="5315964" y="1708645"/>
+              <a:ext cx="1800000" cy="1800000"/>
+            </a:xfrm>
+            <a:prstGeom prst="arc">
+              <a:avLst>
+                <a:gd name="adj1" fmla="val 15476377"/>
+                <a:gd name="adj2" fmla="val 982794"/>
+              </a:avLst>
+            </a:prstGeom>
+            <a:ln w="19050">
+              <a:solidFill>
+                <a:srgbClr val="FF0000"/>
+              </a:solidFill>
+              <a:tailEnd type="triangle"/>
+            </a:ln>
+          </p:spPr>
+          <p:style>
+            <a:lnRef idx="1">
+              <a:schemeClr val="accent1"/>
+            </a:lnRef>
+            <a:fillRef idx="0">
+              <a:schemeClr val="accent1"/>
+            </a:fillRef>
+            <a:effectRef idx="0">
+              <a:schemeClr val="accent1"/>
+            </a:effectRef>
+            <a:fontRef idx="minor">
+              <a:schemeClr val="tx1"/>
+            </a:fontRef>
+          </p:style>
+          <p:txBody>
+            <a:bodyPr rtlCol="0" anchor="ctr"/>
+            <a:lstStyle/>
+            <a:p>
+              <a:pPr algn="ctr"/>
+              <a:endParaRPr lang="de-DE" dirty="0"/>
+            </a:p>
+          </p:txBody>
+        </p:sp>
+        <p:sp>
+          <p:nvSpPr>
+            <p:cNvPr id="3" name="Textfeld 2">
+              <a:extLst>
+                <a:ext uri="{FF2B5EF4-FFF2-40B4-BE49-F238E27FC236}">
+                  <a16:creationId xmlns:a16="http://schemas.microsoft.com/office/drawing/2014/main" id="{D68DE2CF-4104-4AEA-9D43-1D8BA9E4E51E}"/>
+                </a:ext>
+              </a:extLst>
+            </p:cNvPr>
+            <p:cNvSpPr txBox="1"/>
+            <p:nvPr/>
+          </p:nvSpPr>
+          <p:spPr>
+            <a:xfrm>
+              <a:off x="6064013" y="1373937"/>
+              <a:ext cx="300082" cy="369332"/>
+            </a:xfrm>
+            <a:prstGeom prst="rect">
+              <a:avLst/>
+            </a:prstGeom>
+            <a:noFill/>
+          </p:spPr>
+          <p:txBody>
+            <a:bodyPr wrap="none" rtlCol="0">
+              <a:spAutoFit/>
+            </a:bodyPr>
+            <a:lstStyle/>
+            <a:p>
+              <a:r>
+                <a:rPr lang="de-DE" b="1" dirty="0">
+                  <a:solidFill>
+                    <a:srgbClr val="FF0000"/>
+                  </a:solidFill>
+                </a:rPr>
+                <a:t>&lt;</a:t>
+              </a:r>
+            </a:p>
+          </p:txBody>
+        </p:sp>
+      </p:grpSp>
+      <p:grpSp>
+        <p:nvGrpSpPr>
+          <p:cNvPr id="32" name="Gruppieren 31">
+            <a:extLst>
+              <a:ext uri="{FF2B5EF4-FFF2-40B4-BE49-F238E27FC236}">
+                <a16:creationId xmlns:a16="http://schemas.microsoft.com/office/drawing/2014/main" id="{FB2BAB95-EDED-431F-A96C-3A3682ACCB35}"/>
+              </a:ext>
+            </a:extLst>
+          </p:cNvPr>
+          <p:cNvGrpSpPr/>
+          <p:nvPr/>
+        </p:nvGrpSpPr>
+        <p:grpSpPr>
+          <a:xfrm>
+            <a:off x="5314054" y="3554416"/>
+            <a:ext cx="1800000" cy="2134708"/>
+            <a:chOff x="5315964" y="1373937"/>
+            <a:chExt cx="1800000" cy="2134708"/>
+          </a:xfrm>
+        </p:grpSpPr>
+        <p:sp>
+          <p:nvSpPr>
+            <p:cNvPr id="33" name="Bogen 32">
+              <a:extLst>
+                <a:ext uri="{FF2B5EF4-FFF2-40B4-BE49-F238E27FC236}">
+                  <a16:creationId xmlns:a16="http://schemas.microsoft.com/office/drawing/2014/main" id="{CF5F2B8E-BCDC-4433-9F0B-DFA160B24CD2}"/>
+                </a:ext>
+              </a:extLst>
+            </p:cNvPr>
+            <p:cNvSpPr/>
+            <p:nvPr/>
+          </p:nvSpPr>
+          <p:spPr>
+            <a:xfrm rot="-2700000">
+              <a:off x="5315964" y="1708645"/>
+              <a:ext cx="1800000" cy="1800000"/>
+            </a:xfrm>
+            <a:prstGeom prst="arc">
+              <a:avLst>
+                <a:gd name="adj1" fmla="val 15476377"/>
+                <a:gd name="adj2" fmla="val 982794"/>
+              </a:avLst>
+            </a:prstGeom>
+            <a:ln w="19050">
+              <a:solidFill>
+                <a:srgbClr val="FF0000"/>
+              </a:solidFill>
+              <a:tailEnd type="triangle"/>
+            </a:ln>
+          </p:spPr>
+          <p:style>
+            <a:lnRef idx="1">
+              <a:schemeClr val="accent1"/>
+            </a:lnRef>
+            <a:fillRef idx="0">
+              <a:schemeClr val="accent1"/>
+            </a:fillRef>
+            <a:effectRef idx="0">
+              <a:schemeClr val="accent1"/>
+            </a:effectRef>
+            <a:fontRef idx="minor">
+              <a:schemeClr val="tx1"/>
+            </a:fontRef>
+          </p:style>
+          <p:txBody>
+            <a:bodyPr rtlCol="0" anchor="ctr"/>
+            <a:lstStyle/>
+            <a:p>
+              <a:pPr algn="ctr"/>
+              <a:endParaRPr lang="de-DE" dirty="0"/>
+            </a:p>
+          </p:txBody>
+        </p:sp>
+        <p:sp>
+          <p:nvSpPr>
+            <p:cNvPr id="34" name="Textfeld 33">
+              <a:extLst>
+                <a:ext uri="{FF2B5EF4-FFF2-40B4-BE49-F238E27FC236}">
+                  <a16:creationId xmlns:a16="http://schemas.microsoft.com/office/drawing/2014/main" id="{0AA50769-7DBE-4124-B487-EC64A99DB37B}"/>
+                </a:ext>
+              </a:extLst>
+            </p:cNvPr>
+            <p:cNvSpPr txBox="1"/>
+            <p:nvPr/>
+          </p:nvSpPr>
+          <p:spPr>
+            <a:xfrm>
+              <a:off x="6064013" y="1373937"/>
+              <a:ext cx="300082" cy="369332"/>
+            </a:xfrm>
+            <a:prstGeom prst="rect">
+              <a:avLst/>
+            </a:prstGeom>
+            <a:noFill/>
+          </p:spPr>
+          <p:txBody>
+            <a:bodyPr wrap="none" rtlCol="0">
+              <a:spAutoFit/>
+            </a:bodyPr>
+            <a:lstStyle/>
+            <a:p>
+              <a:r>
+                <a:rPr lang="de-DE" b="1" dirty="0">
+                  <a:solidFill>
+                    <a:srgbClr val="FF0000"/>
+                  </a:solidFill>
+                </a:rPr>
+                <a:t>&lt;</a:t>
+              </a:r>
+            </a:p>
+          </p:txBody>
+        </p:sp>
+      </p:grpSp>
+      <p:sp>
+        <p:nvSpPr>
+          <p:cNvPr id="5" name="Ellipse 4">
+            <a:extLst>
+              <a:ext uri="{FF2B5EF4-FFF2-40B4-BE49-F238E27FC236}">
+                <a16:creationId xmlns:a16="http://schemas.microsoft.com/office/drawing/2014/main" id="{8C77D7B8-5F6D-4192-BEE6-4E7EC6D50BC7}"/>
+              </a:ext>
+            </a:extLst>
+          </p:cNvPr>
+          <p:cNvSpPr/>
+          <p:nvPr/>
+        </p:nvSpPr>
+        <p:spPr>
+          <a:xfrm rot="-2700000">
+            <a:off x="3988920" y="2206525"/>
+            <a:ext cx="2060341" cy="1301082"/>
+          </a:xfrm>
+          <a:prstGeom prst="ellipse">
+            <a:avLst/>
+          </a:prstGeom>
+          <a:noFill/>
+          <a:ln w="25400">
+            <a:solidFill>
+              <a:srgbClr val="FFC000"/>
+            </a:solidFill>
+          </a:ln>
+        </p:spPr>
+        <p:style>
+          <a:lnRef idx="2">
+            <a:schemeClr val="accent1">
+              <a:shade val="50000"/>
+            </a:schemeClr>
+          </a:lnRef>
+          <a:fillRef idx="1">
+            <a:schemeClr val="accent1"/>
+          </a:fillRef>
+          <a:effectRef idx="0">
+            <a:schemeClr val="accent1"/>
+          </a:effectRef>
+          <a:fontRef idx="minor">
+            <a:schemeClr val="lt1"/>
+          </a:fontRef>
+        </p:style>
+        <p:txBody>
+          <a:bodyPr rtlCol="0" anchor="ctr"/>
+          <a:lstStyle/>
+          <a:p>
+            <a:pPr algn="ctr"/>
+            <a:endParaRPr lang="de-DE"/>
+          </a:p>
+        </p:txBody>
+      </p:sp>
+      <p:sp>
+        <p:nvSpPr>
+          <p:cNvPr id="35" name="Ellipse 34">
+            <a:extLst>
+              <a:ext uri="{FF2B5EF4-FFF2-40B4-BE49-F238E27FC236}">
+                <a16:creationId xmlns:a16="http://schemas.microsoft.com/office/drawing/2014/main" id="{6A030DC7-812E-4602-A1C6-57ADEB827C2E}"/>
+              </a:ext>
+            </a:extLst>
+          </p:cNvPr>
+          <p:cNvSpPr/>
+          <p:nvPr/>
+        </p:nvSpPr>
+        <p:spPr>
+          <a:xfrm rot="-2700000">
+            <a:off x="6147693" y="4377299"/>
+            <a:ext cx="2060341" cy="1301082"/>
+          </a:xfrm>
+          <a:prstGeom prst="ellipse">
+            <a:avLst/>
+          </a:prstGeom>
+          <a:noFill/>
+          <a:ln w="25400">
+            <a:solidFill>
+              <a:srgbClr val="FFC000"/>
+            </a:solidFill>
+          </a:ln>
+        </p:spPr>
+        <p:style>
+          <a:lnRef idx="2">
+            <a:schemeClr val="accent1">
+              <a:shade val="50000"/>
+            </a:schemeClr>
+          </a:lnRef>
+          <a:fillRef idx="1">
+            <a:schemeClr val="accent1"/>
+          </a:fillRef>
+          <a:effectRef idx="0">
+            <a:schemeClr val="accent1"/>
+          </a:effectRef>
+          <a:fontRef idx="minor">
+            <a:schemeClr val="lt1"/>
+          </a:fontRef>
+        </p:style>
+        <p:txBody>
+          <a:bodyPr rtlCol="0" anchor="ctr"/>
+          <a:lstStyle/>
+          <a:p>
+            <a:pPr algn="ctr"/>
+            <a:endParaRPr lang="de-DE"/>
+          </a:p>
+        </p:txBody>
+      </p:sp>
     </p:spTree>
     <p:extLst>
       <p:ext uri="{BB962C8B-B14F-4D97-AF65-F5344CB8AC3E}">
@@ -5304,6 +5640,288 @@
                                         <p:cTn id="32" dur="500"/>
                                         <p:tgtEl>
                                           <p:spTgt spid="24"/>
+                                        </p:tgtEl>
+                                      </p:cBhvr>
+                                    </p:animEffect>
+                                  </p:childTnLst>
+                                </p:cTn>
+                              </p:par>
+                            </p:childTnLst>
+                          </p:cTn>
+                        </p:par>
+                      </p:childTnLst>
+                    </p:cTn>
+                  </p:par>
+                  <p:par>
+                    <p:cTn id="33" fill="hold">
+                      <p:stCondLst>
+                        <p:cond delay="indefinite"/>
+                      </p:stCondLst>
+                      <p:childTnLst>
+                        <p:par>
+                          <p:cTn id="34" fill="hold">
+                            <p:stCondLst>
+                              <p:cond delay="0"/>
+                            </p:stCondLst>
+                            <p:childTnLst>
+                              <p:par>
+                                <p:cTn id="35" presetID="10" presetClass="entr" presetSubtype="0" fill="hold" nodeType="clickEffect">
+                                  <p:stCondLst>
+                                    <p:cond delay="0"/>
+                                  </p:stCondLst>
+                                  <p:childTnLst>
+                                    <p:set>
+                                      <p:cBhvr>
+                                        <p:cTn id="36" dur="1" fill="hold">
+                                          <p:stCondLst>
+                                            <p:cond delay="0"/>
+                                          </p:stCondLst>
+                                        </p:cTn>
+                                        <p:tgtEl>
+                                          <p:spTgt spid="4"/>
+                                        </p:tgtEl>
+                                        <p:attrNameLst>
+                                          <p:attrName>style.visibility</p:attrName>
+                                        </p:attrNameLst>
+                                      </p:cBhvr>
+                                      <p:to>
+                                        <p:strVal val="visible"/>
+                                      </p:to>
+                                    </p:set>
+                                    <p:animEffect transition="in" filter="fade">
+                                      <p:cBhvr>
+                                        <p:cTn id="37" dur="500"/>
+                                        <p:tgtEl>
+                                          <p:spTgt spid="4"/>
+                                        </p:tgtEl>
+                                      </p:cBhvr>
+                                    </p:animEffect>
+                                  </p:childTnLst>
+                                </p:cTn>
+                              </p:par>
+                            </p:childTnLst>
+                          </p:cTn>
+                        </p:par>
+                      </p:childTnLst>
+                    </p:cTn>
+                  </p:par>
+                  <p:par>
+                    <p:cTn id="38" fill="hold">
+                      <p:stCondLst>
+                        <p:cond delay="indefinite"/>
+                      </p:stCondLst>
+                      <p:childTnLst>
+                        <p:par>
+                          <p:cTn id="39" fill="hold">
+                            <p:stCondLst>
+                              <p:cond delay="0"/>
+                            </p:stCondLst>
+                            <p:childTnLst>
+                              <p:par>
+                                <p:cTn id="40" presetID="10" presetClass="entr" presetSubtype="0" fill="hold" nodeType="clickEffect">
+                                  <p:stCondLst>
+                                    <p:cond delay="0"/>
+                                  </p:stCondLst>
+                                  <p:childTnLst>
+                                    <p:set>
+                                      <p:cBhvr>
+                                        <p:cTn id="41" dur="1" fill="hold">
+                                          <p:stCondLst>
+                                            <p:cond delay="0"/>
+                                          </p:stCondLst>
+                                        </p:cTn>
+                                        <p:tgtEl>
+                                          <p:spTgt spid="32"/>
+                                        </p:tgtEl>
+                                        <p:attrNameLst>
+                                          <p:attrName>style.visibility</p:attrName>
+                                        </p:attrNameLst>
+                                      </p:cBhvr>
+                                      <p:to>
+                                        <p:strVal val="visible"/>
+                                      </p:to>
+                                    </p:set>
+                                    <p:animEffect transition="in" filter="fade">
+                                      <p:cBhvr>
+                                        <p:cTn id="42" dur="500"/>
+                                        <p:tgtEl>
+                                          <p:spTgt spid="32"/>
+                                        </p:tgtEl>
+                                      </p:cBhvr>
+                                    </p:animEffect>
+                                  </p:childTnLst>
+                                </p:cTn>
+                              </p:par>
+                            </p:childTnLst>
+                          </p:cTn>
+                        </p:par>
+                      </p:childTnLst>
+                    </p:cTn>
+                  </p:par>
+                  <p:par>
+                    <p:cTn id="43" fill="hold">
+                      <p:stCondLst>
+                        <p:cond delay="indefinite"/>
+                      </p:stCondLst>
+                      <p:childTnLst>
+                        <p:par>
+                          <p:cTn id="44" fill="hold">
+                            <p:stCondLst>
+                              <p:cond delay="0"/>
+                            </p:stCondLst>
+                            <p:childTnLst>
+                              <p:par>
+                                <p:cTn id="45" presetID="10" presetClass="exit" presetSubtype="0" fill="hold" nodeType="clickEffect">
+                                  <p:stCondLst>
+                                    <p:cond delay="0"/>
+                                  </p:stCondLst>
+                                  <p:childTnLst>
+                                    <p:animEffect transition="out" filter="fade">
+                                      <p:cBhvr>
+                                        <p:cTn id="46" dur="500"/>
+                                        <p:tgtEl>
+                                          <p:spTgt spid="4"/>
+                                        </p:tgtEl>
+                                      </p:cBhvr>
+                                    </p:animEffect>
+                                    <p:set>
+                                      <p:cBhvr>
+                                        <p:cTn id="47" dur="1" fill="hold">
+                                          <p:stCondLst>
+                                            <p:cond delay="499"/>
+                                          </p:stCondLst>
+                                        </p:cTn>
+                                        <p:tgtEl>
+                                          <p:spTgt spid="4"/>
+                                        </p:tgtEl>
+                                        <p:attrNameLst>
+                                          <p:attrName>style.visibility</p:attrName>
+                                        </p:attrNameLst>
+                                      </p:cBhvr>
+                                      <p:to>
+                                        <p:strVal val="hidden"/>
+                                      </p:to>
+                                    </p:set>
+                                  </p:childTnLst>
+                                </p:cTn>
+                              </p:par>
+                              <p:par>
+                                <p:cTn id="48" presetID="10" presetClass="exit" presetSubtype="0" fill="hold" nodeType="withEffect">
+                                  <p:stCondLst>
+                                    <p:cond delay="0"/>
+                                  </p:stCondLst>
+                                  <p:childTnLst>
+                                    <p:animEffect transition="out" filter="fade">
+                                      <p:cBhvr>
+                                        <p:cTn id="49" dur="500"/>
+                                        <p:tgtEl>
+                                          <p:spTgt spid="32"/>
+                                        </p:tgtEl>
+                                      </p:cBhvr>
+                                    </p:animEffect>
+                                    <p:set>
+                                      <p:cBhvr>
+                                        <p:cTn id="50" dur="1" fill="hold">
+                                          <p:stCondLst>
+                                            <p:cond delay="499"/>
+                                          </p:stCondLst>
+                                        </p:cTn>
+                                        <p:tgtEl>
+                                          <p:spTgt spid="32"/>
+                                        </p:tgtEl>
+                                        <p:attrNameLst>
+                                          <p:attrName>style.visibility</p:attrName>
+                                        </p:attrNameLst>
+                                      </p:cBhvr>
+                                      <p:to>
+                                        <p:strVal val="hidden"/>
+                                      </p:to>
+                                    </p:set>
+                                  </p:childTnLst>
+                                </p:cTn>
+                              </p:par>
+                              <p:par>
+                                <p:cTn id="51" presetID="10" presetClass="entr" presetSubtype="0" fill="hold" grpId="0" nodeType="withEffect">
+                                  <p:stCondLst>
+                                    <p:cond delay="0"/>
+                                  </p:stCondLst>
+                                  <p:childTnLst>
+                                    <p:set>
+                                      <p:cBhvr>
+                                        <p:cTn id="52" dur="1" fill="hold">
+                                          <p:stCondLst>
+                                            <p:cond delay="0"/>
+                                          </p:stCondLst>
+                                        </p:cTn>
+                                        <p:tgtEl>
+                                          <p:spTgt spid="5"/>
+                                        </p:tgtEl>
+                                        <p:attrNameLst>
+                                          <p:attrName>style.visibility</p:attrName>
+                                        </p:attrNameLst>
+                                      </p:cBhvr>
+                                      <p:to>
+                                        <p:strVal val="visible"/>
+                                      </p:to>
+                                    </p:set>
+                                    <p:animEffect transition="in" filter="fade">
+                                      <p:cBhvr>
+                                        <p:cTn id="53" dur="500"/>
+                                        <p:tgtEl>
+                                          <p:spTgt spid="5"/>
+                                        </p:tgtEl>
+                                      </p:cBhvr>
+                                    </p:animEffect>
+                                  </p:childTnLst>
+                                </p:cTn>
+                              </p:par>
+                            </p:childTnLst>
+                          </p:cTn>
+                        </p:par>
+                      </p:childTnLst>
+                    </p:cTn>
+                  </p:par>
+                  <p:par>
+                    <p:cTn id="54" fill="hold">
+                      <p:stCondLst>
+                        <p:cond delay="indefinite"/>
+                      </p:stCondLst>
+                      <p:childTnLst>
+                        <p:par>
+                          <p:cTn id="55" fill="hold">
+                            <p:stCondLst>
+                              <p:cond delay="0"/>
+                            </p:stCondLst>
+                            <p:childTnLst>
+                              <p:par>
+                                <p:cTn id="56" presetID="10" presetClass="entr" presetSubtype="0" fill="hold" grpId="0" nodeType="clickEffect">
+                                  <p:stCondLst>
+                                    <p:cond delay="0"/>
+                                  </p:stCondLst>
+                                  <p:childTnLst>
+                                    <p:set>
+                                      <p:cBhvr>
+                                        <p:cTn id="57" dur="1" fill="hold">
+                                          <p:stCondLst>
+                                            <p:cond delay="0"/>
+                                          </p:stCondLst>
+                                        </p:cTn>
+                                        <p:tgtEl>
+                                          <p:spTgt spid="35"/>
+                                        </p:tgtEl>
+                                        <p:attrNameLst>
+                                          <p:attrName>style.visibility</p:attrName>
+                                        </p:attrNameLst>
+                                      </p:cBhvr>
+                                      <p:to>
+                                        <p:strVal val="visible"/>
+                                      </p:to>
+                                    </p:set>
+                                    <p:animEffect transition="in" filter="fade">
+                                      <p:cBhvr>
+                                        <p:cTn id="58" dur="500"/>
+                                        <p:tgtEl>
+                                          <p:spTgt spid="35"/>
                                         </p:tgtEl>
                                       </p:cBhvr>
                                     </p:animEffect>
@@ -5346,12 +5964,44 @@
       <p:bldP spid="26" grpId="0"/>
       <p:bldP spid="27" grpId="0"/>
       <p:bldP spid="28" grpId="0"/>
+      <p:bldP spid="5" grpId="0" animBg="1"/>
+      <p:bldP spid="35" grpId="0" animBg="1"/>
     </p:bldLst>
   </p:timing>
 </p:sld>
 </file>
 
 <file path=ppt/slides/slide4.xml><?xml version="1.0" encoding="utf-8"?>
+<p:sld xmlns:a="http://schemas.openxmlformats.org/drawingml/2006/main" xmlns:r="http://schemas.openxmlformats.org/officeDocument/2006/relationships" xmlns:p="http://schemas.openxmlformats.org/presentationml/2006/main">
+  <p:cSld>
+    <p:spTree>
+      <p:nvGrpSpPr>
+        <p:cNvPr id="1" name=""/>
+        <p:cNvGrpSpPr/>
+        <p:nvPr/>
+      </p:nvGrpSpPr>
+      <p:grpSpPr>
+        <a:xfrm>
+          <a:off x="0" y="0"/>
+          <a:ext cx="0" cy="0"/>
+          <a:chOff x="0" y="0"/>
+          <a:chExt cx="0" cy="0"/>
+        </a:xfrm>
+      </p:grpSpPr>
+    </p:spTree>
+    <p:extLst>
+      <p:ext uri="{BB962C8B-B14F-4D97-AF65-F5344CB8AC3E}">
+        <p14:creationId xmlns:p14="http://schemas.microsoft.com/office/powerpoint/2010/main" val="489357188"/>
+      </p:ext>
+    </p:extLst>
+  </p:cSld>
+  <p:clrMapOvr>
+    <a:masterClrMapping/>
+  </p:clrMapOvr>
+</p:sld>
+</file>
+
+<file path=ppt/slides/slide5.xml><?xml version="1.0" encoding="utf-8"?>
 <p:sld xmlns:a="http://schemas.openxmlformats.org/drawingml/2006/main" xmlns:r="http://schemas.openxmlformats.org/officeDocument/2006/relationships" xmlns:p="http://schemas.openxmlformats.org/presentationml/2006/main">
   <p:cSld>
     <p:spTree>
@@ -6180,7 +6830,7 @@
 </p:sld>
 </file>
 
-<file path=ppt/slides/slide5.xml><?xml version="1.0" encoding="utf-8"?>
+<file path=ppt/slides/slide6.xml><?xml version="1.0" encoding="utf-8"?>
 <p:sld xmlns:a="http://schemas.openxmlformats.org/drawingml/2006/main" xmlns:r="http://schemas.openxmlformats.org/officeDocument/2006/relationships" xmlns:p="http://schemas.openxmlformats.org/presentationml/2006/main">
   <p:cSld>
     <p:spTree>
@@ -12447,7 +13097,7 @@
 </p:sld>
 </file>
 
-<file path=ppt/slides/slide6.xml><?xml version="1.0" encoding="utf-8"?>
+<file path=ppt/slides/slide7.xml><?xml version="1.0" encoding="utf-8"?>
 <p:sld xmlns:a="http://schemas.openxmlformats.org/drawingml/2006/main" xmlns:r="http://schemas.openxmlformats.org/officeDocument/2006/relationships" xmlns:p="http://schemas.openxmlformats.org/presentationml/2006/main">
   <p:cSld>
     <p:spTree>
@@ -13121,7 +13771,7 @@
 </p:sld>
 </file>
 
-<file path=ppt/slides/slide7.xml><?xml version="1.0" encoding="utf-8"?>
+<file path=ppt/slides/slide8.xml><?xml version="1.0" encoding="utf-8"?>
 <p:sld xmlns:a="http://schemas.openxmlformats.org/drawingml/2006/main" xmlns:r="http://schemas.openxmlformats.org/officeDocument/2006/relationships" xmlns:p="http://schemas.openxmlformats.org/presentationml/2006/main">
   <p:cSld>
     <p:spTree>

</xml_diff>